<commit_message>
Notes working for realsies.
Reworked the notes and notes master code to be less of a hack,
and fixed multiple minor problems that prevented PowerPoint
from being happy with the results. My test output now loads more
or less correctly in PowerPoint, Keynote, Libre Office and Google
Docs.

More tests needed, obviously. :-)
</commit_message>
<xml_diff>
--- a/pptx/templates/default.pptx
+++ b/pptx/templates/default.pptx
@@ -4,6 +4,13 @@
   <p:sldMasterIdLst>
     <p:sldMasterId id="2147483648" r:id="rId1"/>
   </p:sldMasterIdLst>
+  <p:notesMasterIdLst>
+    <p:notesMasterId r:id="rId4"/>
+  </p:notesMasterIdLst>
+  <p:sldIdLst>
+    <p:sldId id="256" r:id="rId2"/>
+    <p:sldId id="257" r:id="rId3"/>
+  </p:sldIdLst>
   <p:sldSz cx="9144000" cy="6858000" type="screen4x3"/>
   <p:notesSz cx="6858000" cy="9144000"/>
   <p:defaultTextStyle>
@@ -104,6 +111,549 @@
 </p:presentation>
 </file>
 
+<file path=ppt/notesMasters/notesMaster1.xml><?xml version="1.0" encoding="utf-8"?>
+<p:notesMaster xmlns:a="http://schemas.openxmlformats.org/drawingml/2006/main" xmlns:r="http://schemas.openxmlformats.org/officeDocument/2006/relationships" xmlns:p="http://schemas.openxmlformats.org/presentationml/2006/main">
+  <p:cSld>
+    <p:bg>
+      <p:bgRef idx="1001">
+        <a:schemeClr val="bg1"/>
+      </p:bgRef>
+    </p:bg>
+    <p:spTree>
+      <p:nvGrpSpPr>
+        <p:cNvPr id="1" name=""/>
+        <p:cNvGrpSpPr/>
+        <p:nvPr/>
+      </p:nvGrpSpPr>
+      <p:grpSpPr>
+        <a:xfrm>
+          <a:off x="0" y="0"/>
+          <a:ext cx="0" cy="0"/>
+          <a:chOff x="0" y="0"/>
+          <a:chExt cx="0" cy="0"/>
+        </a:xfrm>
+      </p:grpSpPr>
+      <p:sp>
+        <p:nvSpPr>
+          <p:cNvPr id="2" name="Header Placeholder 1"/>
+          <p:cNvSpPr>
+            <a:spLocks noGrp="1"/>
+          </p:cNvSpPr>
+          <p:nvPr>
+            <p:ph type="hdr" sz="quarter"/>
+          </p:nvPr>
+        </p:nvSpPr>
+        <p:spPr>
+          <a:xfrm>
+            <a:off x="0" y="0"/>
+            <a:ext cx="2971800" cy="457200"/>
+          </a:xfrm>
+          <a:prstGeom prst="rect">
+            <a:avLst/>
+          </a:prstGeom>
+        </p:spPr>
+        <p:txBody>
+          <a:bodyPr vert="horz" lIns="91440" tIns="45720" rIns="91440" bIns="45720" rtlCol="0"/>
+          <a:lstStyle>
+            <a:lvl1pPr algn="l">
+              <a:defRPr sz="1200"/>
+            </a:lvl1pPr>
+          </a:lstStyle>
+          <a:p>
+            <a:endParaRPr lang="en-US"/>
+          </a:p>
+        </p:txBody>
+      </p:sp>
+      <p:sp>
+        <p:nvSpPr>
+          <p:cNvPr id="3" name="Date Placeholder 2"/>
+          <p:cNvSpPr>
+            <a:spLocks noGrp="1"/>
+          </p:cNvSpPr>
+          <p:nvPr>
+            <p:ph type="dt" idx="1"/>
+          </p:nvPr>
+        </p:nvSpPr>
+        <p:spPr>
+          <a:xfrm>
+            <a:off x="3884613" y="0"/>
+            <a:ext cx="2971800" cy="457200"/>
+          </a:xfrm>
+          <a:prstGeom prst="rect">
+            <a:avLst/>
+          </a:prstGeom>
+        </p:spPr>
+        <p:txBody>
+          <a:bodyPr vert="horz" lIns="91440" tIns="45720" rIns="91440" bIns="45720" rtlCol="0"/>
+          <a:lstStyle>
+            <a:lvl1pPr algn="r">
+              <a:defRPr sz="1200"/>
+            </a:lvl1pPr>
+          </a:lstStyle>
+          <a:p>
+            <a:fld id="{BEDEE7E9-75E5-DC4E-9F70-4D2FC5ADCE35}" type="datetimeFigureOut">
+              <a:rPr lang="en-US" smtClean="0"/>
+              <a:t>12/8/15</a:t>
+            </a:fld>
+            <a:endParaRPr lang="en-US"/>
+          </a:p>
+        </p:txBody>
+      </p:sp>
+      <p:sp>
+        <p:nvSpPr>
+          <p:cNvPr id="4" name="Slide Image Placeholder 3"/>
+          <p:cNvSpPr>
+            <a:spLocks noGrp="1" noRot="1" noChangeAspect="1"/>
+          </p:cNvSpPr>
+          <p:nvPr>
+            <p:ph type="sldImg" idx="2"/>
+          </p:nvPr>
+        </p:nvSpPr>
+        <p:spPr>
+          <a:xfrm>
+            <a:off x="1143000" y="685800"/>
+            <a:ext cx="4572000" cy="3429000"/>
+          </a:xfrm>
+          <a:prstGeom prst="rect">
+            <a:avLst/>
+          </a:prstGeom>
+          <a:noFill/>
+          <a:ln w="12700">
+            <a:solidFill>
+              <a:prstClr val="black"/>
+            </a:solidFill>
+          </a:ln>
+        </p:spPr>
+        <p:txBody>
+          <a:bodyPr vert="horz" lIns="91440" tIns="45720" rIns="91440" bIns="45720" rtlCol="0" anchor="ctr"/>
+          <a:lstStyle/>
+          <a:p>
+            <a:endParaRPr lang="en-US"/>
+          </a:p>
+        </p:txBody>
+      </p:sp>
+      <p:sp>
+        <p:nvSpPr>
+          <p:cNvPr id="5" name="Notes Placeholder 4"/>
+          <p:cNvSpPr>
+            <a:spLocks noGrp="1"/>
+          </p:cNvSpPr>
+          <p:nvPr>
+            <p:ph type="body" sz="quarter" idx="3"/>
+          </p:nvPr>
+        </p:nvSpPr>
+        <p:spPr>
+          <a:xfrm>
+            <a:off x="685800" y="4343400"/>
+            <a:ext cx="5486400" cy="4114800"/>
+          </a:xfrm>
+          <a:prstGeom prst="rect">
+            <a:avLst/>
+          </a:prstGeom>
+        </p:spPr>
+        <p:txBody>
+          <a:bodyPr vert="horz" lIns="91440" tIns="45720" rIns="91440" bIns="45720" rtlCol="0"/>
+          <a:lstStyle/>
+          <a:p>
+            <a:pPr lvl="0"/>
+            <a:r>
+              <a:rPr lang="en-US" smtClean="0"/>
+              <a:t>Click to edit Master text styles</a:t>
+            </a:r>
+          </a:p>
+          <a:p>
+            <a:pPr lvl="1"/>
+            <a:r>
+              <a:rPr lang="en-US" smtClean="0"/>
+              <a:t>Second level</a:t>
+            </a:r>
+          </a:p>
+          <a:p>
+            <a:pPr lvl="2"/>
+            <a:r>
+              <a:rPr lang="en-US" smtClean="0"/>
+              <a:t>Third level</a:t>
+            </a:r>
+          </a:p>
+          <a:p>
+            <a:pPr lvl="3"/>
+            <a:r>
+              <a:rPr lang="en-US" smtClean="0"/>
+              <a:t>Fourth level</a:t>
+            </a:r>
+          </a:p>
+          <a:p>
+            <a:pPr lvl="4"/>
+            <a:r>
+              <a:rPr lang="en-US" smtClean="0"/>
+              <a:t>Fifth level</a:t>
+            </a:r>
+            <a:endParaRPr lang="en-US"/>
+          </a:p>
+        </p:txBody>
+      </p:sp>
+      <p:sp>
+        <p:nvSpPr>
+          <p:cNvPr id="6" name="Footer Placeholder 5"/>
+          <p:cNvSpPr>
+            <a:spLocks noGrp="1"/>
+          </p:cNvSpPr>
+          <p:nvPr>
+            <p:ph type="ftr" sz="quarter" idx="4"/>
+          </p:nvPr>
+        </p:nvSpPr>
+        <p:spPr>
+          <a:xfrm>
+            <a:off x="0" y="8685213"/>
+            <a:ext cx="2971800" cy="457200"/>
+          </a:xfrm>
+          <a:prstGeom prst="rect">
+            <a:avLst/>
+          </a:prstGeom>
+        </p:spPr>
+        <p:txBody>
+          <a:bodyPr vert="horz" lIns="91440" tIns="45720" rIns="91440" bIns="45720" rtlCol="0" anchor="b"/>
+          <a:lstStyle>
+            <a:lvl1pPr algn="l">
+              <a:defRPr sz="1200"/>
+            </a:lvl1pPr>
+          </a:lstStyle>
+          <a:p>
+            <a:endParaRPr lang="en-US"/>
+          </a:p>
+        </p:txBody>
+      </p:sp>
+      <p:sp>
+        <p:nvSpPr>
+          <p:cNvPr id="7" name="Slide Number Placeholder 6"/>
+          <p:cNvSpPr>
+            <a:spLocks noGrp="1"/>
+          </p:cNvSpPr>
+          <p:nvPr>
+            <p:ph type="sldNum" sz="quarter" idx="5"/>
+          </p:nvPr>
+        </p:nvSpPr>
+        <p:spPr>
+          <a:xfrm>
+            <a:off x="3884613" y="8685213"/>
+            <a:ext cx="2971800" cy="457200"/>
+          </a:xfrm>
+          <a:prstGeom prst="rect">
+            <a:avLst/>
+          </a:prstGeom>
+        </p:spPr>
+        <p:txBody>
+          <a:bodyPr vert="horz" lIns="91440" tIns="45720" rIns="91440" bIns="45720" rtlCol="0" anchor="b"/>
+          <a:lstStyle>
+            <a:lvl1pPr algn="r">
+              <a:defRPr sz="1200"/>
+            </a:lvl1pPr>
+          </a:lstStyle>
+          <a:p>
+            <a:fld id="{5AB66B80-363B-1443-9B6C-A64CC61AAEF3}" type="slidenum">
+              <a:rPr lang="en-US" smtClean="0"/>
+              <a:t>‹#›</a:t>
+            </a:fld>
+            <a:endParaRPr lang="en-US"/>
+          </a:p>
+        </p:txBody>
+      </p:sp>
+    </p:spTree>
+    <p:extLst>
+      <p:ext uri="{BB962C8B-B14F-4D97-AF65-F5344CB8AC3E}">
+        <p14:creationId xmlns:p14="http://schemas.microsoft.com/office/powerpoint/2010/main" val="2816328648"/>
+      </p:ext>
+    </p:extLst>
+  </p:cSld>
+  <p:clrMap bg1="lt1" tx1="dk1" bg2="lt2" tx2="dk2" accent1="accent1" accent2="accent2" accent3="accent3" accent4="accent4" accent5="accent5" accent6="accent6" hlink="hlink" folHlink="folHlink"/>
+  <p:notesStyle>
+    <a:lvl1pPr marL="0" algn="l" defTabSz="457200" rtl="0" eaLnBrk="1" latinLnBrk="0" hangingPunct="1">
+      <a:defRPr sz="1200" kern="1200">
+        <a:solidFill>
+          <a:schemeClr val="tx1"/>
+        </a:solidFill>
+        <a:latin typeface="+mn-lt"/>
+        <a:ea typeface="+mn-ea"/>
+        <a:cs typeface="+mn-cs"/>
+      </a:defRPr>
+    </a:lvl1pPr>
+    <a:lvl2pPr marL="457200" algn="l" defTabSz="457200" rtl="0" eaLnBrk="1" latinLnBrk="0" hangingPunct="1">
+      <a:defRPr sz="1200" kern="1200">
+        <a:solidFill>
+          <a:schemeClr val="tx1"/>
+        </a:solidFill>
+        <a:latin typeface="+mn-lt"/>
+        <a:ea typeface="+mn-ea"/>
+        <a:cs typeface="+mn-cs"/>
+      </a:defRPr>
+    </a:lvl2pPr>
+    <a:lvl3pPr marL="914400" algn="l" defTabSz="457200" rtl="0" eaLnBrk="1" latinLnBrk="0" hangingPunct="1">
+      <a:defRPr sz="1200" kern="1200">
+        <a:solidFill>
+          <a:schemeClr val="tx1"/>
+        </a:solidFill>
+        <a:latin typeface="+mn-lt"/>
+        <a:ea typeface="+mn-ea"/>
+        <a:cs typeface="+mn-cs"/>
+      </a:defRPr>
+    </a:lvl3pPr>
+    <a:lvl4pPr marL="1371600" algn="l" defTabSz="457200" rtl="0" eaLnBrk="1" latinLnBrk="0" hangingPunct="1">
+      <a:defRPr sz="1200" kern="1200">
+        <a:solidFill>
+          <a:schemeClr val="tx1"/>
+        </a:solidFill>
+        <a:latin typeface="+mn-lt"/>
+        <a:ea typeface="+mn-ea"/>
+        <a:cs typeface="+mn-cs"/>
+      </a:defRPr>
+    </a:lvl4pPr>
+    <a:lvl5pPr marL="1828800" algn="l" defTabSz="457200" rtl="0" eaLnBrk="1" latinLnBrk="0" hangingPunct="1">
+      <a:defRPr sz="1200" kern="1200">
+        <a:solidFill>
+          <a:schemeClr val="tx1"/>
+        </a:solidFill>
+        <a:latin typeface="+mn-lt"/>
+        <a:ea typeface="+mn-ea"/>
+        <a:cs typeface="+mn-cs"/>
+      </a:defRPr>
+    </a:lvl5pPr>
+    <a:lvl6pPr marL="2286000" algn="l" defTabSz="457200" rtl="0" eaLnBrk="1" latinLnBrk="0" hangingPunct="1">
+      <a:defRPr sz="1200" kern="1200">
+        <a:solidFill>
+          <a:schemeClr val="tx1"/>
+        </a:solidFill>
+        <a:latin typeface="+mn-lt"/>
+        <a:ea typeface="+mn-ea"/>
+        <a:cs typeface="+mn-cs"/>
+      </a:defRPr>
+    </a:lvl6pPr>
+    <a:lvl7pPr marL="2743200" algn="l" defTabSz="457200" rtl="0" eaLnBrk="1" latinLnBrk="0" hangingPunct="1">
+      <a:defRPr sz="1200" kern="1200">
+        <a:solidFill>
+          <a:schemeClr val="tx1"/>
+        </a:solidFill>
+        <a:latin typeface="+mn-lt"/>
+        <a:ea typeface="+mn-ea"/>
+        <a:cs typeface="+mn-cs"/>
+      </a:defRPr>
+    </a:lvl7pPr>
+    <a:lvl8pPr marL="3200400" algn="l" defTabSz="457200" rtl="0" eaLnBrk="1" latinLnBrk="0" hangingPunct="1">
+      <a:defRPr sz="1200" kern="1200">
+        <a:solidFill>
+          <a:schemeClr val="tx1"/>
+        </a:solidFill>
+        <a:latin typeface="+mn-lt"/>
+        <a:ea typeface="+mn-ea"/>
+        <a:cs typeface="+mn-cs"/>
+      </a:defRPr>
+    </a:lvl8pPr>
+    <a:lvl9pPr marL="3657600" algn="l" defTabSz="457200" rtl="0" eaLnBrk="1" latinLnBrk="0" hangingPunct="1">
+      <a:defRPr sz="1200" kern="1200">
+        <a:solidFill>
+          <a:schemeClr val="tx1"/>
+        </a:solidFill>
+        <a:latin typeface="+mn-lt"/>
+        <a:ea typeface="+mn-ea"/>
+        <a:cs typeface="+mn-cs"/>
+      </a:defRPr>
+    </a:lvl9pPr>
+  </p:notesStyle>
+</p:notesMaster>
+</file>
+
+<file path=ppt/notesSlides/notesSlide1.xml><?xml version="1.0" encoding="utf-8"?>
+<p:notes xmlns:a="http://schemas.openxmlformats.org/drawingml/2006/main" xmlns:r="http://schemas.openxmlformats.org/officeDocument/2006/relationships" xmlns:p="http://schemas.openxmlformats.org/presentationml/2006/main">
+  <p:cSld>
+    <p:spTree>
+      <p:nvGrpSpPr>
+        <p:cNvPr id="1" name=""/>
+        <p:cNvGrpSpPr/>
+        <p:nvPr/>
+      </p:nvGrpSpPr>
+      <p:grpSpPr>
+        <a:xfrm>
+          <a:off x="0" y="0"/>
+          <a:ext cx="0" cy="0"/>
+          <a:chOff x="0" y="0"/>
+          <a:chExt cx="0" cy="0"/>
+        </a:xfrm>
+      </p:grpSpPr>
+      <p:sp>
+        <p:nvSpPr>
+          <p:cNvPr id="2" name="Slide Image Placeholder 1"/>
+          <p:cNvSpPr>
+            <a:spLocks noGrp="1" noRot="1" noChangeAspect="1"/>
+          </p:cNvSpPr>
+          <p:nvPr>
+            <p:ph type="sldImg"/>
+          </p:nvPr>
+        </p:nvSpPr>
+        <p:spPr/>
+      </p:sp>
+      <p:sp>
+        <p:nvSpPr>
+          <p:cNvPr id="3" name="Notes Placeholder 2"/>
+          <p:cNvSpPr>
+            <a:spLocks noGrp="1"/>
+          </p:cNvSpPr>
+          <p:nvPr>
+            <p:ph type="body" idx="1"/>
+          </p:nvPr>
+        </p:nvSpPr>
+        <p:spPr/>
+        <p:txBody>
+          <a:bodyPr/>
+          <a:lstStyle/>
+          <a:p>
+            <a:r>
+              <a:rPr lang="en-US" dirty="0" smtClean="0"/>
+              <a:t>Notes</a:t>
+            </a:r>
+            <a:r>
+              <a:rPr lang="en-US" baseline="0" dirty="0" smtClean="0"/>
+              <a:t> go here.</a:t>
+            </a:r>
+            <a:endParaRPr lang="en-US" dirty="0"/>
+          </a:p>
+        </p:txBody>
+      </p:sp>
+      <p:sp>
+        <p:nvSpPr>
+          <p:cNvPr id="4" name="Slide Number Placeholder 3"/>
+          <p:cNvSpPr>
+            <a:spLocks noGrp="1"/>
+          </p:cNvSpPr>
+          <p:nvPr>
+            <p:ph type="sldNum" sz="quarter" idx="10"/>
+          </p:nvPr>
+        </p:nvSpPr>
+        <p:spPr/>
+        <p:txBody>
+          <a:bodyPr/>
+          <a:lstStyle/>
+          <a:p>
+            <a:fld id="{5AB66B80-363B-1443-9B6C-A64CC61AAEF3}" type="slidenum">
+              <a:rPr lang="en-US" smtClean="0"/>
+              <a:t>1</a:t>
+            </a:fld>
+            <a:endParaRPr lang="en-US"/>
+          </a:p>
+        </p:txBody>
+      </p:sp>
+    </p:spTree>
+    <p:extLst>
+      <p:ext uri="{BB962C8B-B14F-4D97-AF65-F5344CB8AC3E}">
+        <p14:creationId xmlns:p14="http://schemas.microsoft.com/office/powerpoint/2010/main" val="2423804384"/>
+      </p:ext>
+    </p:extLst>
+  </p:cSld>
+  <p:clrMapOvr>
+    <a:masterClrMapping/>
+  </p:clrMapOvr>
+</p:notes>
+</file>
+
+<file path=ppt/notesSlides/notesSlide2.xml><?xml version="1.0" encoding="utf-8"?>
+<p:notes xmlns:a="http://schemas.openxmlformats.org/drawingml/2006/main" xmlns:r="http://schemas.openxmlformats.org/officeDocument/2006/relationships" xmlns:p="http://schemas.openxmlformats.org/presentationml/2006/main">
+  <p:cSld>
+    <p:spTree>
+      <p:nvGrpSpPr>
+        <p:cNvPr id="1" name=""/>
+        <p:cNvGrpSpPr/>
+        <p:nvPr/>
+      </p:nvGrpSpPr>
+      <p:grpSpPr>
+        <a:xfrm>
+          <a:off x="0" y="0"/>
+          <a:ext cx="0" cy="0"/>
+          <a:chOff x="0" y="0"/>
+          <a:chExt cx="0" cy="0"/>
+        </a:xfrm>
+      </p:grpSpPr>
+      <p:sp>
+        <p:nvSpPr>
+          <p:cNvPr id="2" name="Slide Image Placeholder 1"/>
+          <p:cNvSpPr>
+            <a:spLocks noGrp="1" noRot="1" noChangeAspect="1"/>
+          </p:cNvSpPr>
+          <p:nvPr>
+            <p:ph type="sldImg"/>
+          </p:nvPr>
+        </p:nvSpPr>
+        <p:spPr/>
+      </p:sp>
+      <p:sp>
+        <p:nvSpPr>
+          <p:cNvPr id="3" name="Notes Placeholder 2"/>
+          <p:cNvSpPr>
+            <a:spLocks noGrp="1"/>
+          </p:cNvSpPr>
+          <p:nvPr>
+            <p:ph type="body" idx="1"/>
+          </p:nvPr>
+        </p:nvSpPr>
+        <p:spPr/>
+        <p:txBody>
+          <a:bodyPr/>
+          <a:lstStyle/>
+          <a:p>
+            <a:r>
+              <a:rPr lang="en-US" dirty="0" smtClean="0"/>
+              <a:t>This is a second set of notes.</a:t>
+            </a:r>
+          </a:p>
+          <a:p>
+            <a:endParaRPr lang="en-US" dirty="0" smtClean="0"/>
+          </a:p>
+          <a:p>
+            <a:r>
+              <a:rPr lang="en-US" dirty="0" smtClean="0"/>
+              <a:t>This line is separated from the previous by one </a:t>
+            </a:r>
+            <a:r>
+              <a:rPr lang="en-US" smtClean="0"/>
+              <a:t>blank line.</a:t>
+            </a:r>
+            <a:endParaRPr lang="en-US" dirty="0"/>
+          </a:p>
+        </p:txBody>
+      </p:sp>
+      <p:sp>
+        <p:nvSpPr>
+          <p:cNvPr id="4" name="Slide Number Placeholder 3"/>
+          <p:cNvSpPr>
+            <a:spLocks noGrp="1"/>
+          </p:cNvSpPr>
+          <p:nvPr>
+            <p:ph type="sldNum" sz="quarter" idx="10"/>
+          </p:nvPr>
+        </p:nvSpPr>
+        <p:spPr/>
+        <p:txBody>
+          <a:bodyPr/>
+          <a:lstStyle/>
+          <a:p>
+            <a:fld id="{5AB66B80-363B-1443-9B6C-A64CC61AAEF3}" type="slidenum">
+              <a:rPr lang="en-US" smtClean="0"/>
+              <a:t>2</a:t>
+            </a:fld>
+            <a:endParaRPr lang="en-US"/>
+          </a:p>
+        </p:txBody>
+      </p:sp>
+    </p:spTree>
+    <p:extLst>
+      <p:ext uri="{BB962C8B-B14F-4D97-AF65-F5344CB8AC3E}">
+        <p14:creationId xmlns:p14="http://schemas.microsoft.com/office/powerpoint/2010/main" val="2423804384"/>
+      </p:ext>
+    </p:extLst>
+  </p:cSld>
+  <p:clrMapOvr>
+    <a:masterClrMapping/>
+  </p:clrMapOvr>
+</p:notes>
+</file>
+
 <file path=ppt/slideLayouts/slideLayout1.xml><?xml version="1.0" encoding="utf-8"?>
 <p:sldLayout xmlns:a="http://schemas.openxmlformats.org/drawingml/2006/main" xmlns:r="http://schemas.openxmlformats.org/officeDocument/2006/relationships" xmlns:p="http://schemas.openxmlformats.org/presentationml/2006/main" type="title" preserve="1">
   <p:cSld name="Title Slide">
@@ -283,9 +833,9 @@
           <a:bodyPr/>
           <a:lstStyle/>
           <a:p>
-            <a:fld id="{5BCAD085-E8A6-8845-BD4E-CB4CCA059FC4}" type="datetimeFigureOut">
-              <a:rPr lang="en-US" smtClean="0"/>
-              <a:t>1/27/13</a:t>
+            <a:fld id="{379BF288-2C2A-AB4B-88E8-CEB81F85249D}" type="datetimeFigureOut">
+              <a:rPr lang="en-US" smtClean="0"/>
+              <a:t>12/8/15</a:t>
             </a:fld>
             <a:endParaRPr lang="en-US"/>
           </a:p>
@@ -325,7 +875,7 @@
           <a:bodyPr/>
           <a:lstStyle/>
           <a:p>
-            <a:fld id="{C1FF6DA9-008F-8B48-92A6-B652298478BF}" type="slidenum">
+            <a:fld id="{FAFC7EB1-05B9-614D-A722-A866855867E8}" type="slidenum">
               <a:rPr lang="en-US" smtClean="0"/>
               <a:t>‹#›</a:t>
             </a:fld>
@@ -336,7 +886,7 @@
     </p:spTree>
     <p:extLst>
       <p:ext uri="{BB962C8B-B14F-4D97-AF65-F5344CB8AC3E}">
-        <p14:creationId xmlns:p14="http://schemas.microsoft.com/office/powerpoint/2010/main" val="3168075583"/>
+        <p14:creationId xmlns:p14="http://schemas.microsoft.com/office/powerpoint/2010/main" val="2942809341"/>
       </p:ext>
     </p:extLst>
   </p:cSld>
@@ -453,9 +1003,9 @@
           <a:bodyPr/>
           <a:lstStyle/>
           <a:p>
-            <a:fld id="{5BCAD085-E8A6-8845-BD4E-CB4CCA059FC4}" type="datetimeFigureOut">
-              <a:rPr lang="en-US" smtClean="0"/>
-              <a:t>1/27/13</a:t>
+            <a:fld id="{379BF288-2C2A-AB4B-88E8-CEB81F85249D}" type="datetimeFigureOut">
+              <a:rPr lang="en-US" smtClean="0"/>
+              <a:t>12/8/15</a:t>
             </a:fld>
             <a:endParaRPr lang="en-US"/>
           </a:p>
@@ -495,7 +1045,7 @@
           <a:bodyPr/>
           <a:lstStyle/>
           <a:p>
-            <a:fld id="{C1FF6DA9-008F-8B48-92A6-B652298478BF}" type="slidenum">
+            <a:fld id="{FAFC7EB1-05B9-614D-A722-A866855867E8}" type="slidenum">
               <a:rPr lang="en-US" smtClean="0"/>
               <a:t>‹#›</a:t>
             </a:fld>
@@ -506,7 +1056,7 @@
     </p:spTree>
     <p:extLst>
       <p:ext uri="{BB962C8B-B14F-4D97-AF65-F5344CB8AC3E}">
-        <p14:creationId xmlns:p14="http://schemas.microsoft.com/office/powerpoint/2010/main" val="2910927964"/>
+        <p14:creationId xmlns:p14="http://schemas.microsoft.com/office/powerpoint/2010/main" val="3083077125"/>
       </p:ext>
     </p:extLst>
   </p:cSld>
@@ -633,9 +1183,9 @@
           <a:bodyPr/>
           <a:lstStyle/>
           <a:p>
-            <a:fld id="{5BCAD085-E8A6-8845-BD4E-CB4CCA059FC4}" type="datetimeFigureOut">
-              <a:rPr lang="en-US" smtClean="0"/>
-              <a:t>1/27/13</a:t>
+            <a:fld id="{379BF288-2C2A-AB4B-88E8-CEB81F85249D}" type="datetimeFigureOut">
+              <a:rPr lang="en-US" smtClean="0"/>
+              <a:t>12/8/15</a:t>
             </a:fld>
             <a:endParaRPr lang="en-US"/>
           </a:p>
@@ -675,7 +1225,7 @@
           <a:bodyPr/>
           <a:lstStyle/>
           <a:p>
-            <a:fld id="{C1FF6DA9-008F-8B48-92A6-B652298478BF}" type="slidenum">
+            <a:fld id="{FAFC7EB1-05B9-614D-A722-A866855867E8}" type="slidenum">
               <a:rPr lang="en-US" smtClean="0"/>
               <a:t>‹#›</a:t>
             </a:fld>
@@ -686,7 +1236,7 @@
     </p:spTree>
     <p:extLst>
       <p:ext uri="{BB962C8B-B14F-4D97-AF65-F5344CB8AC3E}">
-        <p14:creationId xmlns:p14="http://schemas.microsoft.com/office/powerpoint/2010/main" val="3612223792"/>
+        <p14:creationId xmlns:p14="http://schemas.microsoft.com/office/powerpoint/2010/main" val="699813918"/>
       </p:ext>
     </p:extLst>
   </p:cSld>
@@ -803,9 +1353,9 @@
           <a:bodyPr/>
           <a:lstStyle/>
           <a:p>
-            <a:fld id="{5BCAD085-E8A6-8845-BD4E-CB4CCA059FC4}" type="datetimeFigureOut">
-              <a:rPr lang="en-US" smtClean="0"/>
-              <a:t>1/27/13</a:t>
+            <a:fld id="{379BF288-2C2A-AB4B-88E8-CEB81F85249D}" type="datetimeFigureOut">
+              <a:rPr lang="en-US" smtClean="0"/>
+              <a:t>12/8/15</a:t>
             </a:fld>
             <a:endParaRPr lang="en-US"/>
           </a:p>
@@ -845,7 +1395,7 @@
           <a:bodyPr/>
           <a:lstStyle/>
           <a:p>
-            <a:fld id="{C1FF6DA9-008F-8B48-92A6-B652298478BF}" type="slidenum">
+            <a:fld id="{FAFC7EB1-05B9-614D-A722-A866855867E8}" type="slidenum">
               <a:rPr lang="en-US" smtClean="0"/>
               <a:t>‹#›</a:t>
             </a:fld>
@@ -856,7 +1406,7 @@
     </p:spTree>
     <p:extLst>
       <p:ext uri="{BB962C8B-B14F-4D97-AF65-F5344CB8AC3E}">
-        <p14:creationId xmlns:p14="http://schemas.microsoft.com/office/powerpoint/2010/main" val="2614314258"/>
+        <p14:creationId xmlns:p14="http://schemas.microsoft.com/office/powerpoint/2010/main" val="1007970568"/>
       </p:ext>
     </p:extLst>
   </p:cSld>
@@ -1049,9 +1599,9 @@
           <a:bodyPr/>
           <a:lstStyle/>
           <a:p>
-            <a:fld id="{5BCAD085-E8A6-8845-BD4E-CB4CCA059FC4}" type="datetimeFigureOut">
-              <a:rPr lang="en-US" smtClean="0"/>
-              <a:t>1/27/13</a:t>
+            <a:fld id="{379BF288-2C2A-AB4B-88E8-CEB81F85249D}" type="datetimeFigureOut">
+              <a:rPr lang="en-US" smtClean="0"/>
+              <a:t>12/8/15</a:t>
             </a:fld>
             <a:endParaRPr lang="en-US"/>
           </a:p>
@@ -1091,7 +1641,7 @@
           <a:bodyPr/>
           <a:lstStyle/>
           <a:p>
-            <a:fld id="{C1FF6DA9-008F-8B48-92A6-B652298478BF}" type="slidenum">
+            <a:fld id="{FAFC7EB1-05B9-614D-A722-A866855867E8}" type="slidenum">
               <a:rPr lang="en-US" smtClean="0"/>
               <a:t>‹#›</a:t>
             </a:fld>
@@ -1102,7 +1652,7 @@
     </p:spTree>
     <p:extLst>
       <p:ext uri="{BB962C8B-B14F-4D97-AF65-F5344CB8AC3E}">
-        <p14:creationId xmlns:p14="http://schemas.microsoft.com/office/powerpoint/2010/main" val="960648375"/>
+        <p14:creationId xmlns:p14="http://schemas.microsoft.com/office/powerpoint/2010/main" val="1902426472"/>
       </p:ext>
     </p:extLst>
   </p:cSld>
@@ -1337,9 +1887,9 @@
           <a:bodyPr/>
           <a:lstStyle/>
           <a:p>
-            <a:fld id="{5BCAD085-E8A6-8845-BD4E-CB4CCA059FC4}" type="datetimeFigureOut">
-              <a:rPr lang="en-US" smtClean="0"/>
-              <a:t>1/27/13</a:t>
+            <a:fld id="{379BF288-2C2A-AB4B-88E8-CEB81F85249D}" type="datetimeFigureOut">
+              <a:rPr lang="en-US" smtClean="0"/>
+              <a:t>12/8/15</a:t>
             </a:fld>
             <a:endParaRPr lang="en-US"/>
           </a:p>
@@ -1379,7 +1929,7 @@
           <a:bodyPr/>
           <a:lstStyle/>
           <a:p>
-            <a:fld id="{C1FF6DA9-008F-8B48-92A6-B652298478BF}" type="slidenum">
+            <a:fld id="{FAFC7EB1-05B9-614D-A722-A866855867E8}" type="slidenum">
               <a:rPr lang="en-US" smtClean="0"/>
               <a:t>‹#›</a:t>
             </a:fld>
@@ -1390,7 +1940,7 @@
     </p:spTree>
     <p:extLst>
       <p:ext uri="{BB962C8B-B14F-4D97-AF65-F5344CB8AC3E}">
-        <p14:creationId xmlns:p14="http://schemas.microsoft.com/office/powerpoint/2010/main" val="2782244947"/>
+        <p14:creationId xmlns:p14="http://schemas.microsoft.com/office/powerpoint/2010/main" val="4190259335"/>
       </p:ext>
     </p:extLst>
   </p:cSld>
@@ -1759,9 +2309,9 @@
           <a:bodyPr/>
           <a:lstStyle/>
           <a:p>
-            <a:fld id="{5BCAD085-E8A6-8845-BD4E-CB4CCA059FC4}" type="datetimeFigureOut">
-              <a:rPr lang="en-US" smtClean="0"/>
-              <a:t>1/27/13</a:t>
+            <a:fld id="{379BF288-2C2A-AB4B-88E8-CEB81F85249D}" type="datetimeFigureOut">
+              <a:rPr lang="en-US" smtClean="0"/>
+              <a:t>12/8/15</a:t>
             </a:fld>
             <a:endParaRPr lang="en-US"/>
           </a:p>
@@ -1801,7 +2351,7 @@
           <a:bodyPr/>
           <a:lstStyle/>
           <a:p>
-            <a:fld id="{C1FF6DA9-008F-8B48-92A6-B652298478BF}" type="slidenum">
+            <a:fld id="{FAFC7EB1-05B9-614D-A722-A866855867E8}" type="slidenum">
               <a:rPr lang="en-US" smtClean="0"/>
               <a:t>‹#›</a:t>
             </a:fld>
@@ -1812,7 +2362,7 @@
     </p:spTree>
     <p:extLst>
       <p:ext uri="{BB962C8B-B14F-4D97-AF65-F5344CB8AC3E}">
-        <p14:creationId xmlns:p14="http://schemas.microsoft.com/office/powerpoint/2010/main" val="990158736"/>
+        <p14:creationId xmlns:p14="http://schemas.microsoft.com/office/powerpoint/2010/main" val="4250370043"/>
       </p:ext>
     </p:extLst>
   </p:cSld>
@@ -1877,9 +2427,9 @@
           <a:bodyPr/>
           <a:lstStyle/>
           <a:p>
-            <a:fld id="{5BCAD085-E8A6-8845-BD4E-CB4CCA059FC4}" type="datetimeFigureOut">
-              <a:rPr lang="en-US" smtClean="0"/>
-              <a:t>1/27/13</a:t>
+            <a:fld id="{379BF288-2C2A-AB4B-88E8-CEB81F85249D}" type="datetimeFigureOut">
+              <a:rPr lang="en-US" smtClean="0"/>
+              <a:t>12/8/15</a:t>
             </a:fld>
             <a:endParaRPr lang="en-US"/>
           </a:p>
@@ -1919,7 +2469,7 @@
           <a:bodyPr/>
           <a:lstStyle/>
           <a:p>
-            <a:fld id="{C1FF6DA9-008F-8B48-92A6-B652298478BF}" type="slidenum">
+            <a:fld id="{FAFC7EB1-05B9-614D-A722-A866855867E8}" type="slidenum">
               <a:rPr lang="en-US" smtClean="0"/>
               <a:t>‹#›</a:t>
             </a:fld>
@@ -1930,7 +2480,7 @@
     </p:spTree>
     <p:extLst>
       <p:ext uri="{BB962C8B-B14F-4D97-AF65-F5344CB8AC3E}">
-        <p14:creationId xmlns:p14="http://schemas.microsoft.com/office/powerpoint/2010/main" val="727027711"/>
+        <p14:creationId xmlns:p14="http://schemas.microsoft.com/office/powerpoint/2010/main" val="298652160"/>
       </p:ext>
     </p:extLst>
   </p:cSld>
@@ -1972,9 +2522,9 @@
           <a:bodyPr/>
           <a:lstStyle/>
           <a:p>
-            <a:fld id="{5BCAD085-E8A6-8845-BD4E-CB4CCA059FC4}" type="datetimeFigureOut">
-              <a:rPr lang="en-US" smtClean="0"/>
-              <a:t>1/27/13</a:t>
+            <a:fld id="{379BF288-2C2A-AB4B-88E8-CEB81F85249D}" type="datetimeFigureOut">
+              <a:rPr lang="en-US" smtClean="0"/>
+              <a:t>12/8/15</a:t>
             </a:fld>
             <a:endParaRPr lang="en-US"/>
           </a:p>
@@ -2014,7 +2564,7 @@
           <a:bodyPr/>
           <a:lstStyle/>
           <a:p>
-            <a:fld id="{C1FF6DA9-008F-8B48-92A6-B652298478BF}" type="slidenum">
+            <a:fld id="{FAFC7EB1-05B9-614D-A722-A866855867E8}" type="slidenum">
               <a:rPr lang="en-US" smtClean="0"/>
               <a:t>‹#›</a:t>
             </a:fld>
@@ -2025,7 +2575,7 @@
     </p:spTree>
     <p:extLst>
       <p:ext uri="{BB962C8B-B14F-4D97-AF65-F5344CB8AC3E}">
-        <p14:creationId xmlns:p14="http://schemas.microsoft.com/office/powerpoint/2010/main" val="1212999818"/>
+        <p14:creationId xmlns:p14="http://schemas.microsoft.com/office/powerpoint/2010/main" val="3415978984"/>
       </p:ext>
     </p:extLst>
   </p:cSld>
@@ -2249,9 +2799,9 @@
           <a:bodyPr/>
           <a:lstStyle/>
           <a:p>
-            <a:fld id="{5BCAD085-E8A6-8845-BD4E-CB4CCA059FC4}" type="datetimeFigureOut">
-              <a:rPr lang="en-US" smtClean="0"/>
-              <a:t>1/27/13</a:t>
+            <a:fld id="{379BF288-2C2A-AB4B-88E8-CEB81F85249D}" type="datetimeFigureOut">
+              <a:rPr lang="en-US" smtClean="0"/>
+              <a:t>12/8/15</a:t>
             </a:fld>
             <a:endParaRPr lang="en-US"/>
           </a:p>
@@ -2291,7 +2841,7 @@
           <a:bodyPr/>
           <a:lstStyle/>
           <a:p>
-            <a:fld id="{C1FF6DA9-008F-8B48-92A6-B652298478BF}" type="slidenum">
+            <a:fld id="{FAFC7EB1-05B9-614D-A722-A866855867E8}" type="slidenum">
               <a:rPr lang="en-US" smtClean="0"/>
               <a:t>‹#›</a:t>
             </a:fld>
@@ -2302,7 +2852,7 @@
     </p:spTree>
     <p:extLst>
       <p:ext uri="{BB962C8B-B14F-4D97-AF65-F5344CB8AC3E}">
-        <p14:creationId xmlns:p14="http://schemas.microsoft.com/office/powerpoint/2010/main" val="1840726560"/>
+        <p14:creationId xmlns:p14="http://schemas.microsoft.com/office/powerpoint/2010/main" val="378549102"/>
       </p:ext>
     </p:extLst>
   </p:cSld>
@@ -2502,9 +3052,9 @@
           <a:bodyPr/>
           <a:lstStyle/>
           <a:p>
-            <a:fld id="{5BCAD085-E8A6-8845-BD4E-CB4CCA059FC4}" type="datetimeFigureOut">
-              <a:rPr lang="en-US" smtClean="0"/>
-              <a:t>1/27/13</a:t>
+            <a:fld id="{379BF288-2C2A-AB4B-88E8-CEB81F85249D}" type="datetimeFigureOut">
+              <a:rPr lang="en-US" smtClean="0"/>
+              <a:t>12/8/15</a:t>
             </a:fld>
             <a:endParaRPr lang="en-US"/>
           </a:p>
@@ -2544,7 +3094,7 @@
           <a:bodyPr/>
           <a:lstStyle/>
           <a:p>
-            <a:fld id="{C1FF6DA9-008F-8B48-92A6-B652298478BF}" type="slidenum">
+            <a:fld id="{FAFC7EB1-05B9-614D-A722-A866855867E8}" type="slidenum">
               <a:rPr lang="en-US" smtClean="0"/>
               <a:t>‹#›</a:t>
             </a:fld>
@@ -2555,7 +3105,7 @@
     </p:spTree>
     <p:extLst>
       <p:ext uri="{BB962C8B-B14F-4D97-AF65-F5344CB8AC3E}">
-        <p14:creationId xmlns:p14="http://schemas.microsoft.com/office/powerpoint/2010/main" val="3889236939"/>
+        <p14:creationId xmlns:p14="http://schemas.microsoft.com/office/powerpoint/2010/main" val="3727540740"/>
       </p:ext>
     </p:extLst>
   </p:cSld>
@@ -2715,9 +3265,9 @@
             </a:lvl1pPr>
           </a:lstStyle>
           <a:p>
-            <a:fld id="{5BCAD085-E8A6-8845-BD4E-CB4CCA059FC4}" type="datetimeFigureOut">
-              <a:rPr lang="en-US" smtClean="0"/>
-              <a:t>1/27/13</a:t>
+            <a:fld id="{379BF288-2C2A-AB4B-88E8-CEB81F85249D}" type="datetimeFigureOut">
+              <a:rPr lang="en-US" smtClean="0"/>
+              <a:t>12/8/15</a:t>
             </a:fld>
             <a:endParaRPr lang="en-US"/>
           </a:p>
@@ -2793,7 +3343,7 @@
             </a:lvl1pPr>
           </a:lstStyle>
           <a:p>
-            <a:fld id="{C1FF6DA9-008F-8B48-92A6-B652298478BF}" type="slidenum">
+            <a:fld id="{FAFC7EB1-05B9-614D-A722-A866855867E8}" type="slidenum">
               <a:rPr lang="en-US" smtClean="0"/>
               <a:t>‹#›</a:t>
             </a:fld>
@@ -2804,7 +3354,7 @@
     </p:spTree>
     <p:extLst>
       <p:ext uri="{BB962C8B-B14F-4D97-AF65-F5344CB8AC3E}">
-        <p14:creationId xmlns:p14="http://schemas.microsoft.com/office/powerpoint/2010/main" val="2209977519"/>
+        <p14:creationId xmlns:p14="http://schemas.microsoft.com/office/powerpoint/2010/main" val="3743031048"/>
       </p:ext>
     </p:extLst>
   </p:cSld>
@@ -3073,6 +3623,142 @@
     </p:otherStyle>
   </p:txStyles>
 </p:sldMaster>
+</file>
+
+<file path=ppt/slides/slide1.xml><?xml version="1.0" encoding="utf-8"?>
+<p:sld xmlns:a="http://schemas.openxmlformats.org/drawingml/2006/main" xmlns:r="http://schemas.openxmlformats.org/officeDocument/2006/relationships" xmlns:p="http://schemas.openxmlformats.org/presentationml/2006/main">
+  <p:cSld>
+    <p:spTree>
+      <p:nvGrpSpPr>
+        <p:cNvPr id="1" name=""/>
+        <p:cNvGrpSpPr/>
+        <p:nvPr/>
+      </p:nvGrpSpPr>
+      <p:grpSpPr>
+        <a:xfrm>
+          <a:off x="0" y="0"/>
+          <a:ext cx="0" cy="0"/>
+          <a:chOff x="0" y="0"/>
+          <a:chExt cx="0" cy="0"/>
+        </a:xfrm>
+      </p:grpSpPr>
+      <p:sp>
+        <p:nvSpPr>
+          <p:cNvPr id="2" name="Title 1"/>
+          <p:cNvSpPr>
+            <a:spLocks noGrp="1"/>
+          </p:cNvSpPr>
+          <p:nvPr>
+            <p:ph type="ctrTitle"/>
+          </p:nvPr>
+        </p:nvSpPr>
+        <p:spPr/>
+        <p:txBody>
+          <a:bodyPr/>
+          <a:lstStyle/>
+          <a:p>
+            <a:endParaRPr lang="en-US"/>
+          </a:p>
+        </p:txBody>
+      </p:sp>
+      <p:sp>
+        <p:nvSpPr>
+          <p:cNvPr id="3" name="Subtitle 2"/>
+          <p:cNvSpPr>
+            <a:spLocks noGrp="1"/>
+          </p:cNvSpPr>
+          <p:nvPr>
+            <p:ph type="subTitle" idx="1"/>
+          </p:nvPr>
+        </p:nvSpPr>
+        <p:spPr/>
+        <p:txBody>
+          <a:bodyPr/>
+          <a:lstStyle/>
+          <a:p>
+            <a:endParaRPr lang="en-US"/>
+          </a:p>
+        </p:txBody>
+      </p:sp>
+    </p:spTree>
+    <p:extLst>
+      <p:ext uri="{BB962C8B-B14F-4D97-AF65-F5344CB8AC3E}">
+        <p14:creationId xmlns:p14="http://schemas.microsoft.com/office/powerpoint/2010/main" val="432393439"/>
+      </p:ext>
+    </p:extLst>
+  </p:cSld>
+  <p:clrMapOvr>
+    <a:masterClrMapping/>
+  </p:clrMapOvr>
+</p:sld>
+</file>
+
+<file path=ppt/slides/slide2.xml><?xml version="1.0" encoding="utf-8"?>
+<p:sld xmlns:a="http://schemas.openxmlformats.org/drawingml/2006/main" xmlns:r="http://schemas.openxmlformats.org/officeDocument/2006/relationships" xmlns:p="http://schemas.openxmlformats.org/presentationml/2006/main">
+  <p:cSld>
+    <p:spTree>
+      <p:nvGrpSpPr>
+        <p:cNvPr id="1" name=""/>
+        <p:cNvGrpSpPr/>
+        <p:nvPr/>
+      </p:nvGrpSpPr>
+      <p:grpSpPr>
+        <a:xfrm>
+          <a:off x="0" y="0"/>
+          <a:ext cx="0" cy="0"/>
+          <a:chOff x="0" y="0"/>
+          <a:chExt cx="0" cy="0"/>
+        </a:xfrm>
+      </p:grpSpPr>
+      <p:sp>
+        <p:nvSpPr>
+          <p:cNvPr id="2" name="Title 1"/>
+          <p:cNvSpPr>
+            <a:spLocks noGrp="1"/>
+          </p:cNvSpPr>
+          <p:nvPr>
+            <p:ph type="ctrTitle"/>
+          </p:nvPr>
+        </p:nvSpPr>
+        <p:spPr/>
+        <p:txBody>
+          <a:bodyPr/>
+          <a:lstStyle/>
+          <a:p>
+            <a:endParaRPr lang="en-US"/>
+          </a:p>
+        </p:txBody>
+      </p:sp>
+      <p:sp>
+        <p:nvSpPr>
+          <p:cNvPr id="3" name="Subtitle 2"/>
+          <p:cNvSpPr>
+            <a:spLocks noGrp="1"/>
+          </p:cNvSpPr>
+          <p:nvPr>
+            <p:ph type="subTitle" idx="1"/>
+          </p:nvPr>
+        </p:nvSpPr>
+        <p:spPr/>
+        <p:txBody>
+          <a:bodyPr/>
+          <a:lstStyle/>
+          <a:p>
+            <a:endParaRPr lang="en-US"/>
+          </a:p>
+        </p:txBody>
+      </p:sp>
+    </p:spTree>
+    <p:extLst>
+      <p:ext uri="{BB962C8B-B14F-4D97-AF65-F5344CB8AC3E}">
+        <p14:creationId xmlns:p14="http://schemas.microsoft.com/office/powerpoint/2010/main" val="214630946"/>
+      </p:ext>
+    </p:extLst>
+  </p:cSld>
+  <p:clrMapOvr>
+    <a:masterClrMapping/>
+  </p:clrMapOvr>
+</p:sld>
 </file>
 
 <file path=ppt/theme/theme1.xml><?xml version="1.0" encoding="utf-8"?>
@@ -3393,4 +4079,324 @@
   </a:objectDefaults>
   <a:extraClrSchemeLst/>
 </a:theme>
+</file>
+
+<file path=ppt/theme/theme2.xml><?xml version="1.0" encoding="utf-8"?>
+<a:theme xmlns:a="http://schemas.openxmlformats.org/drawingml/2006/main" name="Office Theme">
+  <a:themeElements>
+    <a:clrScheme name="Office">
+      <a:dk1>
+        <a:sysClr val="windowText" lastClr="000000"/>
+      </a:dk1>
+      <a:lt1>
+        <a:sysClr val="window" lastClr="FFFFFF"/>
+      </a:lt1>
+      <a:dk2>
+        <a:srgbClr val="1F497D"/>
+      </a:dk2>
+      <a:lt2>
+        <a:srgbClr val="EEECE1"/>
+      </a:lt2>
+      <a:accent1>
+        <a:srgbClr val="4F81BD"/>
+      </a:accent1>
+      <a:accent2>
+        <a:srgbClr val="C0504D"/>
+      </a:accent2>
+      <a:accent3>
+        <a:srgbClr val="9BBB59"/>
+      </a:accent3>
+      <a:accent4>
+        <a:srgbClr val="8064A2"/>
+      </a:accent4>
+      <a:accent5>
+        <a:srgbClr val="4BACC6"/>
+      </a:accent5>
+      <a:accent6>
+        <a:srgbClr val="F79646"/>
+      </a:accent6>
+      <a:hlink>
+        <a:srgbClr val="0000FF"/>
+      </a:hlink>
+      <a:folHlink>
+        <a:srgbClr val="800080"/>
+      </a:folHlink>
+    </a:clrScheme>
+    <a:fontScheme name="Office">
+      <a:majorFont>
+        <a:latin typeface="Calibri"/>
+        <a:ea typeface=""/>
+        <a:cs typeface=""/>
+        <a:font script="Jpan" typeface="ＭＳ Ｐゴシック"/>
+        <a:font script="Hang" typeface="맑은 고딕"/>
+        <a:font script="Hans" typeface="宋体"/>
+        <a:font script="Hant" typeface="新細明體"/>
+        <a:font script="Arab" typeface="Times New Roman"/>
+        <a:font script="Hebr" typeface="Times New Roman"/>
+        <a:font script="Thai" typeface="Angsana New"/>
+        <a:font script="Ethi" typeface="Nyala"/>
+        <a:font script="Beng" typeface="Vrinda"/>
+        <a:font script="Gujr" typeface="Shruti"/>
+        <a:font script="Khmr" typeface="MoolBoran"/>
+        <a:font script="Knda" typeface="Tunga"/>
+        <a:font script="Guru" typeface="Raavi"/>
+        <a:font script="Cans" typeface="Euphemia"/>
+        <a:font script="Cher" typeface="Plantagenet Cherokee"/>
+        <a:font script="Yiii" typeface="Microsoft Yi Baiti"/>
+        <a:font script="Tibt" typeface="Microsoft Himalaya"/>
+        <a:font script="Thaa" typeface="MV Boli"/>
+        <a:font script="Deva" typeface="Mangal"/>
+        <a:font script="Telu" typeface="Gautami"/>
+        <a:font script="Taml" typeface="Latha"/>
+        <a:font script="Syrc" typeface="Estrangelo Edessa"/>
+        <a:font script="Orya" typeface="Kalinga"/>
+        <a:font script="Mlym" typeface="Kartika"/>
+        <a:font script="Laoo" typeface="DokChampa"/>
+        <a:font script="Sinh" typeface="Iskoola Pota"/>
+        <a:font script="Mong" typeface="Mongolian Baiti"/>
+        <a:font script="Viet" typeface="Times New Roman"/>
+        <a:font script="Uigh" typeface="Microsoft Uighur"/>
+        <a:font script="Geor" typeface="Sylfaen"/>
+      </a:majorFont>
+      <a:minorFont>
+        <a:latin typeface="Calibri"/>
+        <a:ea typeface=""/>
+        <a:cs typeface=""/>
+        <a:font script="Jpan" typeface="ＭＳ Ｐゴシック"/>
+        <a:font script="Hang" typeface="맑은 고딕"/>
+        <a:font script="Hans" typeface="宋体"/>
+        <a:font script="Hant" typeface="新細明體"/>
+        <a:font script="Arab" typeface="Arial"/>
+        <a:font script="Hebr" typeface="Arial"/>
+        <a:font script="Thai" typeface="Cordia New"/>
+        <a:font script="Ethi" typeface="Nyala"/>
+        <a:font script="Beng" typeface="Vrinda"/>
+        <a:font script="Gujr" typeface="Shruti"/>
+        <a:font script="Khmr" typeface="DaunPenh"/>
+        <a:font script="Knda" typeface="Tunga"/>
+        <a:font script="Guru" typeface="Raavi"/>
+        <a:font script="Cans" typeface="Euphemia"/>
+        <a:font script="Cher" typeface="Plantagenet Cherokee"/>
+        <a:font script="Yiii" typeface="Microsoft Yi Baiti"/>
+        <a:font script="Tibt" typeface="Microsoft Himalaya"/>
+        <a:font script="Thaa" typeface="MV Boli"/>
+        <a:font script="Deva" typeface="Mangal"/>
+        <a:font script="Telu" typeface="Gautami"/>
+        <a:font script="Taml" typeface="Latha"/>
+        <a:font script="Syrc" typeface="Estrangelo Edessa"/>
+        <a:font script="Orya" typeface="Kalinga"/>
+        <a:font script="Mlym" typeface="Kartika"/>
+        <a:font script="Laoo" typeface="DokChampa"/>
+        <a:font script="Sinh" typeface="Iskoola Pota"/>
+        <a:font script="Mong" typeface="Mongolian Baiti"/>
+        <a:font script="Viet" typeface="Arial"/>
+        <a:font script="Uigh" typeface="Microsoft Uighur"/>
+        <a:font script="Geor" typeface="Sylfaen"/>
+      </a:minorFont>
+    </a:fontScheme>
+    <a:fmtScheme name="Office">
+      <a:fillStyleLst>
+        <a:solidFill>
+          <a:schemeClr val="phClr"/>
+        </a:solidFill>
+        <a:gradFill rotWithShape="1">
+          <a:gsLst>
+            <a:gs pos="0">
+              <a:schemeClr val="phClr">
+                <a:tint val="50000"/>
+                <a:satMod val="300000"/>
+              </a:schemeClr>
+            </a:gs>
+            <a:gs pos="35000">
+              <a:schemeClr val="phClr">
+                <a:tint val="37000"/>
+                <a:satMod val="300000"/>
+              </a:schemeClr>
+            </a:gs>
+            <a:gs pos="100000">
+              <a:schemeClr val="phClr">
+                <a:tint val="15000"/>
+                <a:satMod val="350000"/>
+              </a:schemeClr>
+            </a:gs>
+          </a:gsLst>
+          <a:lin ang="16200000" scaled="1"/>
+        </a:gradFill>
+        <a:gradFill rotWithShape="1">
+          <a:gsLst>
+            <a:gs pos="0">
+              <a:schemeClr val="phClr">
+                <a:tint val="100000"/>
+                <a:shade val="100000"/>
+                <a:satMod val="130000"/>
+              </a:schemeClr>
+            </a:gs>
+            <a:gs pos="100000">
+              <a:schemeClr val="phClr">
+                <a:tint val="50000"/>
+                <a:shade val="100000"/>
+                <a:satMod val="350000"/>
+              </a:schemeClr>
+            </a:gs>
+          </a:gsLst>
+          <a:lin ang="16200000" scaled="0"/>
+        </a:gradFill>
+      </a:fillStyleLst>
+      <a:lnStyleLst>
+        <a:ln w="9525" cap="flat" cmpd="sng" algn="ctr">
+          <a:solidFill>
+            <a:schemeClr val="phClr">
+              <a:shade val="95000"/>
+              <a:satMod val="105000"/>
+            </a:schemeClr>
+          </a:solidFill>
+          <a:prstDash val="solid"/>
+        </a:ln>
+        <a:ln w="25400" cap="flat" cmpd="sng" algn="ctr">
+          <a:solidFill>
+            <a:schemeClr val="phClr"/>
+          </a:solidFill>
+          <a:prstDash val="solid"/>
+        </a:ln>
+        <a:ln w="38100" cap="flat" cmpd="sng" algn="ctr">
+          <a:solidFill>
+            <a:schemeClr val="phClr"/>
+          </a:solidFill>
+          <a:prstDash val="solid"/>
+        </a:ln>
+      </a:lnStyleLst>
+      <a:effectStyleLst>
+        <a:effectStyle>
+          <a:effectLst>
+            <a:outerShdw blurRad="40000" dist="20000" dir="5400000" rotWithShape="0">
+              <a:srgbClr val="000000">
+                <a:alpha val="38000"/>
+              </a:srgbClr>
+            </a:outerShdw>
+          </a:effectLst>
+        </a:effectStyle>
+        <a:effectStyle>
+          <a:effectLst>
+            <a:outerShdw blurRad="40000" dist="23000" dir="5400000" rotWithShape="0">
+              <a:srgbClr val="000000">
+                <a:alpha val="35000"/>
+              </a:srgbClr>
+            </a:outerShdw>
+          </a:effectLst>
+        </a:effectStyle>
+        <a:effectStyle>
+          <a:effectLst>
+            <a:outerShdw blurRad="40000" dist="23000" dir="5400000" rotWithShape="0">
+              <a:srgbClr val="000000">
+                <a:alpha val="35000"/>
+              </a:srgbClr>
+            </a:outerShdw>
+          </a:effectLst>
+          <a:scene3d>
+            <a:camera prst="orthographicFront">
+              <a:rot lat="0" lon="0" rev="0"/>
+            </a:camera>
+            <a:lightRig rig="threePt" dir="t">
+              <a:rot lat="0" lon="0" rev="1200000"/>
+            </a:lightRig>
+          </a:scene3d>
+          <a:sp3d>
+            <a:bevelT w="63500" h="25400"/>
+          </a:sp3d>
+        </a:effectStyle>
+      </a:effectStyleLst>
+      <a:bgFillStyleLst>
+        <a:solidFill>
+          <a:schemeClr val="phClr"/>
+        </a:solidFill>
+        <a:gradFill rotWithShape="1">
+          <a:gsLst>
+            <a:gs pos="0">
+              <a:schemeClr val="phClr">
+                <a:tint val="40000"/>
+                <a:satMod val="350000"/>
+              </a:schemeClr>
+            </a:gs>
+            <a:gs pos="40000">
+              <a:schemeClr val="phClr">
+                <a:tint val="45000"/>
+                <a:shade val="99000"/>
+                <a:satMod val="350000"/>
+              </a:schemeClr>
+            </a:gs>
+            <a:gs pos="100000">
+              <a:schemeClr val="phClr">
+                <a:shade val="20000"/>
+                <a:satMod val="255000"/>
+              </a:schemeClr>
+            </a:gs>
+          </a:gsLst>
+          <a:path path="circle">
+            <a:fillToRect l="50000" t="-80000" r="50000" b="180000"/>
+          </a:path>
+        </a:gradFill>
+        <a:gradFill rotWithShape="1">
+          <a:gsLst>
+            <a:gs pos="0">
+              <a:schemeClr val="phClr">
+                <a:tint val="80000"/>
+                <a:satMod val="300000"/>
+              </a:schemeClr>
+            </a:gs>
+            <a:gs pos="100000">
+              <a:schemeClr val="phClr">
+                <a:shade val="30000"/>
+                <a:satMod val="200000"/>
+              </a:schemeClr>
+            </a:gs>
+          </a:gsLst>
+          <a:path path="circle">
+            <a:fillToRect l="50000" t="50000" r="50000" b="50000"/>
+          </a:path>
+        </a:gradFill>
+      </a:bgFillStyleLst>
+    </a:fmtScheme>
+  </a:themeElements>
+  <a:objectDefaults>
+    <a:spDef>
+      <a:spPr/>
+      <a:bodyPr/>
+      <a:lstStyle/>
+      <a:style>
+        <a:lnRef idx="1">
+          <a:schemeClr val="accent1"/>
+        </a:lnRef>
+        <a:fillRef idx="3">
+          <a:schemeClr val="accent1"/>
+        </a:fillRef>
+        <a:effectRef idx="2">
+          <a:schemeClr val="accent1"/>
+        </a:effectRef>
+        <a:fontRef idx="minor">
+          <a:schemeClr val="lt1"/>
+        </a:fontRef>
+      </a:style>
+    </a:spDef>
+    <a:lnDef>
+      <a:spPr/>
+      <a:bodyPr/>
+      <a:lstStyle/>
+      <a:style>
+        <a:lnRef idx="2">
+          <a:schemeClr val="accent1"/>
+        </a:lnRef>
+        <a:fillRef idx="0">
+          <a:schemeClr val="accent1"/>
+        </a:fillRef>
+        <a:effectRef idx="1">
+          <a:schemeClr val="accent1"/>
+        </a:effectRef>
+        <a:fontRef idx="minor">
+          <a:schemeClr val="tx1"/>
+        </a:fontRef>
+      </a:style>
+    </a:lnDef>
+  </a:objectDefaults>
+  <a:extraClrSchemeLst/>
+</a:theme>
 </file>
</xml_diff>